<commit_message>
last chenges befores project defending
</commit_message>
<xml_diff>
--- a/Barbershop.pptx
+++ b/Barbershop.pptx
@@ -840,7 +840,7 @@
           <a:p>
             <a:fld id="{6B3746D0-C2DB-46D9-89C1-1B2E8B0AB31F}" type="datetimeFigureOut">
               <a:rPr lang="ru-RU" smtClean="0"/>
-              <a:t>05.11.2023</a:t>
+              <a:t>06.11.2023</a:t>
             </a:fld>
             <a:endParaRPr lang="ru-RU"/>
           </a:p>
@@ -1091,7 +1091,7 @@
           <a:p>
             <a:fld id="{6B3746D0-C2DB-46D9-89C1-1B2E8B0AB31F}" type="datetimeFigureOut">
               <a:rPr lang="ru-RU" smtClean="0"/>
-              <a:t>05.11.2023</a:t>
+              <a:t>06.11.2023</a:t>
             </a:fld>
             <a:endParaRPr lang="ru-RU"/>
           </a:p>
@@ -1405,7 +1405,7 @@
           <a:p>
             <a:fld id="{6B3746D0-C2DB-46D9-89C1-1B2E8B0AB31F}" type="datetimeFigureOut">
               <a:rPr lang="ru-RU" smtClean="0"/>
-              <a:t>05.11.2023</a:t>
+              <a:t>06.11.2023</a:t>
             </a:fld>
             <a:endParaRPr lang="ru-RU"/>
           </a:p>
@@ -1746,7 +1746,7 @@
           <a:p>
             <a:fld id="{6B3746D0-C2DB-46D9-89C1-1B2E8B0AB31F}" type="datetimeFigureOut">
               <a:rPr lang="ru-RU" smtClean="0"/>
-              <a:t>05.11.2023</a:t>
+              <a:t>06.11.2023</a:t>
             </a:fld>
             <a:endParaRPr lang="ru-RU"/>
           </a:p>
@@ -2060,7 +2060,7 @@
           <a:p>
             <a:fld id="{6B3746D0-C2DB-46D9-89C1-1B2E8B0AB31F}" type="datetimeFigureOut">
               <a:rPr lang="ru-RU" smtClean="0"/>
-              <a:t>05.11.2023</a:t>
+              <a:t>06.11.2023</a:t>
             </a:fld>
             <a:endParaRPr lang="ru-RU"/>
           </a:p>
@@ -2453,7 +2453,7 @@
           <a:p>
             <a:fld id="{6B3746D0-C2DB-46D9-89C1-1B2E8B0AB31F}" type="datetimeFigureOut">
               <a:rPr lang="ru-RU" smtClean="0"/>
-              <a:t>05.11.2023</a:t>
+              <a:t>06.11.2023</a:t>
             </a:fld>
             <a:endParaRPr lang="ru-RU"/>
           </a:p>
@@ -2623,7 +2623,7 @@
           <a:p>
             <a:fld id="{6B3746D0-C2DB-46D9-89C1-1B2E8B0AB31F}" type="datetimeFigureOut">
               <a:rPr lang="ru-RU" smtClean="0"/>
-              <a:t>05.11.2023</a:t>
+              <a:t>06.11.2023</a:t>
             </a:fld>
             <a:endParaRPr lang="ru-RU"/>
           </a:p>
@@ -2803,7 +2803,7 @@
           <a:p>
             <a:fld id="{6B3746D0-C2DB-46D9-89C1-1B2E8B0AB31F}" type="datetimeFigureOut">
               <a:rPr lang="ru-RU" smtClean="0"/>
-              <a:t>05.11.2023</a:t>
+              <a:t>06.11.2023</a:t>
             </a:fld>
             <a:endParaRPr lang="ru-RU"/>
           </a:p>
@@ -2979,7 +2979,7 @@
           <a:p>
             <a:fld id="{6B3746D0-C2DB-46D9-89C1-1B2E8B0AB31F}" type="datetimeFigureOut">
               <a:rPr lang="ru-RU" smtClean="0"/>
-              <a:t>05.11.2023</a:t>
+              <a:t>06.11.2023</a:t>
             </a:fld>
             <a:endParaRPr lang="ru-RU"/>
           </a:p>
@@ -3226,7 +3226,7 @@
           <a:p>
             <a:fld id="{6B3746D0-C2DB-46D9-89C1-1B2E8B0AB31F}" type="datetimeFigureOut">
               <a:rPr lang="ru-RU" smtClean="0"/>
-              <a:t>05.11.2023</a:t>
+              <a:t>06.11.2023</a:t>
             </a:fld>
             <a:endParaRPr lang="ru-RU"/>
           </a:p>
@@ -3458,7 +3458,7 @@
           <a:p>
             <a:fld id="{6B3746D0-C2DB-46D9-89C1-1B2E8B0AB31F}" type="datetimeFigureOut">
               <a:rPr lang="ru-RU" smtClean="0"/>
-              <a:t>05.11.2023</a:t>
+              <a:t>06.11.2023</a:t>
             </a:fld>
             <a:endParaRPr lang="ru-RU"/>
           </a:p>
@@ -3832,7 +3832,7 @@
           <a:p>
             <a:fld id="{6B3746D0-C2DB-46D9-89C1-1B2E8B0AB31F}" type="datetimeFigureOut">
               <a:rPr lang="ru-RU" smtClean="0"/>
-              <a:t>05.11.2023</a:t>
+              <a:t>06.11.2023</a:t>
             </a:fld>
             <a:endParaRPr lang="ru-RU"/>
           </a:p>
@@ -3955,7 +3955,7 @@
           <a:p>
             <a:fld id="{6B3746D0-C2DB-46D9-89C1-1B2E8B0AB31F}" type="datetimeFigureOut">
               <a:rPr lang="ru-RU" smtClean="0"/>
-              <a:t>05.11.2023</a:t>
+              <a:t>06.11.2023</a:t>
             </a:fld>
             <a:endParaRPr lang="ru-RU"/>
           </a:p>
@@ -4050,7 +4050,7 @@
           <a:p>
             <a:fld id="{6B3746D0-C2DB-46D9-89C1-1B2E8B0AB31F}" type="datetimeFigureOut">
               <a:rPr lang="ru-RU" smtClean="0"/>
-              <a:t>05.11.2023</a:t>
+              <a:t>06.11.2023</a:t>
             </a:fld>
             <a:endParaRPr lang="ru-RU"/>
           </a:p>
@@ -4305,7 +4305,7 @@
           <a:p>
             <a:fld id="{6B3746D0-C2DB-46D9-89C1-1B2E8B0AB31F}" type="datetimeFigureOut">
               <a:rPr lang="ru-RU" smtClean="0"/>
-              <a:t>05.11.2023</a:t>
+              <a:t>06.11.2023</a:t>
             </a:fld>
             <a:endParaRPr lang="ru-RU"/>
           </a:p>
@@ -4568,7 +4568,7 @@
           <a:p>
             <a:fld id="{6B3746D0-C2DB-46D9-89C1-1B2E8B0AB31F}" type="datetimeFigureOut">
               <a:rPr lang="ru-RU" smtClean="0"/>
-              <a:t>05.11.2023</a:t>
+              <a:t>06.11.2023</a:t>
             </a:fld>
             <a:endParaRPr lang="ru-RU"/>
           </a:p>
@@ -5311,7 +5311,7 @@
           <a:p>
             <a:fld id="{6B3746D0-C2DB-46D9-89C1-1B2E8B0AB31F}" type="datetimeFigureOut">
               <a:rPr lang="ru-RU" smtClean="0"/>
-              <a:t>05.11.2023</a:t>
+              <a:t>06.11.2023</a:t>
             </a:fld>
             <a:endParaRPr lang="ru-RU"/>
           </a:p>
@@ -7451,6 +7451,21 @@
               <a:buFont typeface="+mj-lt"/>
               <a:buAutoNum type="arabicPeriod"/>
             </a:pPr>
+            <a:r>
+              <a:rPr lang="ru-RU" dirty="0"/>
+              <a:t>Ограничить запись на дату и время </a:t>
+            </a:r>
+            <a:r>
+              <a:rPr lang="ru-RU"/>
+              <a:t>из прошлого</a:t>
+            </a:r>
+            <a:endParaRPr lang="ru-RU" dirty="0"/>
+          </a:p>
+          <a:p>
+            <a:pPr>
+              <a:buFont typeface="+mj-lt"/>
+              <a:buAutoNum type="arabicPeriod"/>
+            </a:pPr>
             <a:endParaRPr lang="ru-RU" dirty="0"/>
           </a:p>
           <a:p>

</xml_diff>